<commit_message>
pos disagg fg finish?
</commit_message>
<xml_diff>
--- a/doc/figures/figures-positive-disaggregation-feature-guide.pptx
+++ b/doc/figures/figures-positive-disaggregation-feature-guide.pptx
@@ -3837,8 +3837,8 @@
         </p:blipFill>
         <p:spPr>
           <a:xfrm flipH="1">
-            <a:off x="1081882" y="2951178"/>
-            <a:ext cx="291605" cy="291605"/>
+            <a:off x="681277" y="3175001"/>
+            <a:ext cx="192072" cy="192072"/>
           </a:xfrm>
           <a:prstGeom prst="rect">
             <a:avLst/>
@@ -3847,10 +3847,10 @@
       </p:pic>
       <p:pic>
         <p:nvPicPr>
-          <p:cNvPr id="5" name="Picture 4">
-            <a:extLst>
-              <a:ext uri="{FF2B5EF4-FFF2-40B4-BE49-F238E27FC236}">
-                <a16:creationId xmlns:a16="http://schemas.microsoft.com/office/drawing/2014/main" id="{8E157260-9DC3-3B4E-ABC0-EDC6A4666591}"/>
+          <p:cNvPr id="6" name="Picture 5">
+            <a:extLst>
+              <a:ext uri="{FF2B5EF4-FFF2-40B4-BE49-F238E27FC236}">
+                <a16:creationId xmlns:a16="http://schemas.microsoft.com/office/drawing/2014/main" id="{EE9E81CC-17BD-7D47-9DA8-0A8B80145B19}"/>
               </a:ext>
             </a:extLst>
           </p:cNvPr>
@@ -3867,8 +3867,8 @@
         </p:blipFill>
         <p:spPr>
           <a:xfrm flipH="1">
-            <a:off x="1398568" y="2951178"/>
-            <a:ext cx="291605" cy="291605"/>
+            <a:off x="1816777" y="3185343"/>
+            <a:ext cx="192072" cy="192072"/>
           </a:xfrm>
           <a:prstGeom prst="rect">
             <a:avLst/>
@@ -3877,10 +3877,10 @@
       </p:pic>
       <p:pic>
         <p:nvPicPr>
-          <p:cNvPr id="6" name="Picture 5">
-            <a:extLst>
-              <a:ext uri="{FF2B5EF4-FFF2-40B4-BE49-F238E27FC236}">
-                <a16:creationId xmlns:a16="http://schemas.microsoft.com/office/drawing/2014/main" id="{EE9E81CC-17BD-7D47-9DA8-0A8B80145B19}"/>
+          <p:cNvPr id="7" name="Picture 6">
+            <a:extLst>
+              <a:ext uri="{FF2B5EF4-FFF2-40B4-BE49-F238E27FC236}">
+                <a16:creationId xmlns:a16="http://schemas.microsoft.com/office/drawing/2014/main" id="{0360DFB2-C4B4-7845-AD93-66AB2E0AF293}"/>
               </a:ext>
             </a:extLst>
           </p:cNvPr>
@@ -3897,38 +3897,8 @@
         </p:blipFill>
         <p:spPr>
           <a:xfrm flipH="1">
-            <a:off x="1713703" y="2951178"/>
-            <a:ext cx="291605" cy="291605"/>
-          </a:xfrm>
-          <a:prstGeom prst="rect">
-            <a:avLst/>
-          </a:prstGeom>
-        </p:spPr>
-      </p:pic>
-      <p:pic>
-        <p:nvPicPr>
-          <p:cNvPr id="7" name="Picture 6">
-            <a:extLst>
-              <a:ext uri="{FF2B5EF4-FFF2-40B4-BE49-F238E27FC236}">
-                <a16:creationId xmlns:a16="http://schemas.microsoft.com/office/drawing/2014/main" id="{0360DFB2-C4B4-7845-AD93-66AB2E0AF293}"/>
-              </a:ext>
-            </a:extLst>
-          </p:cNvPr>
-          <p:cNvPicPr>
-            <a:picLocks noChangeAspect="1"/>
-          </p:cNvPicPr>
-          <p:nvPr/>
-        </p:nvPicPr>
-        <p:blipFill>
-          <a:blip r:embed="rId3"/>
-          <a:stretch>
-            <a:fillRect/>
-          </a:stretch>
-        </p:blipFill>
-        <p:spPr>
-          <a:xfrm flipH="1">
-            <a:off x="2021560" y="2951178"/>
-            <a:ext cx="291605" cy="291605"/>
+            <a:off x="2929923" y="3185343"/>
+            <a:ext cx="192072" cy="192072"/>
           </a:xfrm>
           <a:prstGeom prst="rect">
             <a:avLst/>

</xml_diff>